<commit_message>
had a look on study, slightly adjusted scg presentation
</commit_message>
<xml_diff>
--- a/presentations/Demo DoodleDebug Spring 2013.pptx
+++ b/presentations/Demo DoodleDebug Spring 2013.pptx
@@ -213,7 +213,7 @@
           <a:p>
             <a:fld id="{236ADE3F-CE78-4304-90DD-69CB0597853E}" type="datetimeFigureOut">
               <a:rPr lang="en-US" smtClean="0"/>
-              <a:t>4/26/2013</a:t>
+              <a:t>4/28/2013</a:t>
             </a:fld>
             <a:endParaRPr lang="en-US"/>
           </a:p>
@@ -944,7 +944,7 @@
           <a:p>
             <a:fld id="{85D650DE-3472-4653-A444-5B443FE7AA4E}" type="datetime1">
               <a:rPr lang="de-CH" smtClean="0"/>
-              <a:t>26.04.2013</a:t>
+              <a:t>28.04.2013</a:t>
             </a:fld>
             <a:endParaRPr lang="de-CH" dirty="0"/>
           </a:p>
@@ -1121,7 +1121,7 @@
           <a:p>
             <a:fld id="{8BAC4E3D-F274-4AF5-9DF1-A78FFCEF68DA}" type="datetime1">
               <a:rPr lang="de-CH" smtClean="0"/>
-              <a:t>26.04.2013</a:t>
+              <a:t>28.04.2013</a:t>
             </a:fld>
             <a:endParaRPr lang="de-CH" dirty="0"/>
           </a:p>
@@ -1301,7 +1301,7 @@
           <a:p>
             <a:fld id="{D3964AF6-022E-43B2-9753-57C33D817030}" type="datetime1">
               <a:rPr lang="de-CH" smtClean="0"/>
-              <a:t>26.04.2013</a:t>
+              <a:t>28.04.2013</a:t>
             </a:fld>
             <a:endParaRPr lang="de-CH" dirty="0"/>
           </a:p>
@@ -1656,7 +1656,7 @@
           <a:p>
             <a:fld id="{437327DC-2552-4A52-A1A3-9B5BFACF3DEF}" type="datetime1">
               <a:rPr lang="de-CH" smtClean="0"/>
-              <a:t>26.04.2013</a:t>
+              <a:t>28.04.2013</a:t>
             </a:fld>
             <a:endParaRPr lang="de-CH" dirty="0"/>
           </a:p>
@@ -1909,7 +1909,7 @@
           <a:p>
             <a:fld id="{7A4171FB-593E-465D-9207-2119903B863E}" type="datetime1">
               <a:rPr lang="de-CH" smtClean="0"/>
-              <a:t>26.04.2013</a:t>
+              <a:t>28.04.2013</a:t>
             </a:fld>
             <a:endParaRPr lang="de-CH" dirty="0"/>
           </a:p>
@@ -2204,7 +2204,7 @@
           <a:p>
             <a:fld id="{BD636A4B-8FF2-43A3-B5BD-A9C3C87E2820}" type="datetime1">
               <a:rPr lang="de-CH" smtClean="0"/>
-              <a:t>26.04.2013</a:t>
+              <a:t>28.04.2013</a:t>
             </a:fld>
             <a:endParaRPr lang="de-CH" dirty="0"/>
           </a:p>
@@ -2626,7 +2626,7 @@
           <a:p>
             <a:fld id="{D77D123E-E927-4D73-B43F-B83145EC633F}" type="datetime1">
               <a:rPr lang="de-CH" smtClean="0"/>
-              <a:t>26.04.2013</a:t>
+              <a:t>28.04.2013</a:t>
             </a:fld>
             <a:endParaRPr lang="de-CH" dirty="0"/>
           </a:p>
@@ -2744,7 +2744,7 @@
           <a:p>
             <a:fld id="{F96081AB-9B45-4EA4-85E7-C7D9AE8BCC30}" type="datetime1">
               <a:rPr lang="de-CH" smtClean="0"/>
-              <a:t>26.04.2013</a:t>
+              <a:t>28.04.2013</a:t>
             </a:fld>
             <a:endParaRPr lang="de-CH" dirty="0"/>
           </a:p>
@@ -2839,7 +2839,7 @@
           <a:p>
             <a:fld id="{1B775301-90B7-4097-BBF9-5E4AF869C7A1}" type="datetime1">
               <a:rPr lang="de-CH" smtClean="0"/>
-              <a:t>26.04.2013</a:t>
+              <a:t>28.04.2013</a:t>
             </a:fld>
             <a:endParaRPr lang="de-CH" dirty="0"/>
           </a:p>
@@ -3116,7 +3116,7 @@
           <a:p>
             <a:fld id="{D7A7FEA8-F11E-4DD5-93BD-B1E529D9AFFF}" type="datetime1">
               <a:rPr lang="de-CH" smtClean="0"/>
-              <a:t>26.04.2013</a:t>
+              <a:t>28.04.2013</a:t>
             </a:fld>
             <a:endParaRPr lang="de-CH" dirty="0"/>
           </a:p>
@@ -3369,7 +3369,7 @@
           <a:p>
             <a:fld id="{C2B89150-C15F-4D6A-BF1B-40AA2F4AABBB}" type="datetime1">
               <a:rPr lang="de-CH" smtClean="0"/>
-              <a:t>26.04.2013</a:t>
+              <a:t>28.04.2013</a:t>
             </a:fld>
             <a:endParaRPr lang="de-CH" dirty="0"/>
           </a:p>
@@ -3582,7 +3582,7 @@
           <a:p>
             <a:fld id="{E65CC87D-290B-4A82-A5FC-87C0639762FA}" type="datetime1">
               <a:rPr lang="de-CH" smtClean="0"/>
-              <a:t>26.04.2013</a:t>
+              <a:t>28.04.2013</a:t>
             </a:fld>
             <a:endParaRPr lang="de-CH" dirty="0"/>
           </a:p>
@@ -7859,11 +7859,7 @@
             </a:br>
             <a:r>
               <a:rPr lang="en-US" dirty="0" smtClean="0"/>
-              <a:t>Two-dimensional arrays and </a:t>
-            </a:r>
-            <a:r>
-              <a:rPr lang="en-US" dirty="0" smtClean="0"/>
-              <a:t>collections</a:t>
+              <a:t>Two-dimensional arrays and collections</a:t>
             </a:r>
             <a:endParaRPr lang="en-US" dirty="0">
               <a:solidFill>
@@ -8367,11 +8363,7 @@
             </a:br>
             <a:r>
               <a:rPr lang="en-US" dirty="0" smtClean="0"/>
-              <a:t>With linking to Eclipse </a:t>
-            </a:r>
-            <a:r>
-              <a:rPr lang="en-US" dirty="0" smtClean="0"/>
-              <a:t>editor</a:t>
+              <a:t>With linking to Eclipse editor</a:t>
             </a:r>
             <a:endParaRPr lang="en-US" dirty="0">
               <a:solidFill>
@@ -9479,7 +9471,7 @@
         <p:spPr/>
         <p:txBody>
           <a:bodyPr>
-            <a:normAutofit lnSpcReduction="10000"/>
+            <a:normAutofit/>
           </a:bodyPr>
           <a:lstStyle/>
           <a:p>
@@ -9492,27 +9484,15 @@
             <a:pPr lvl="1"/>
             <a:r>
               <a:rPr lang="en-US" dirty="0" smtClean="0"/>
-              <a:t>Less program executions</a:t>
-            </a:r>
+              <a:t>Faster problem detection</a:t>
+            </a:r>
+            <a:endParaRPr lang="en-US" dirty="0" smtClean="0"/>
           </a:p>
           <a:p>
             <a:pPr lvl="1"/>
             <a:r>
               <a:rPr lang="en-US" dirty="0" smtClean="0"/>
-              <a:t>Less searching effort</a:t>
-            </a:r>
-          </a:p>
-          <a:p>
-            <a:pPr marL="457200" lvl="1" indent="0">
-              <a:buNone/>
-            </a:pPr>
-            <a:r>
-              <a:rPr lang="en-US" dirty="0" smtClean="0">
-                <a:solidFill>
-                  <a:srgbClr val="FF0000"/>
-                </a:solidFill>
-              </a:rPr>
-              <a:t>What does this mean?</a:t>
+              <a:t>Less customization needed</a:t>
             </a:r>
           </a:p>
           <a:p>
@@ -9557,7 +9537,13 @@
               <a:rPr lang="en-US" dirty="0" smtClean="0">
                 <a:sym typeface="Wingdings" pitchFamily="2" charset="2"/>
               </a:rPr>
-              <a:t>Several minor UI problems</a:t>
+              <a:t>Several </a:t>
+            </a:r>
+            <a:r>
+              <a:rPr lang="en-US" dirty="0" smtClean="0">
+                <a:sym typeface="Wingdings" pitchFamily="2" charset="2"/>
+              </a:rPr>
+              <a:t>minor UI problems</a:t>
             </a:r>
             <a:endParaRPr lang="en-US" dirty="0"/>
           </a:p>
@@ -9910,15 +9896,33 @@
                                   </p:childTnLst>
                                 </p:cTn>
                               </p:par>
+                            </p:childTnLst>
+                          </p:cTn>
+                        </p:par>
+                      </p:childTnLst>
+                    </p:cTn>
+                  </p:par>
+                  <p:par>
+                    <p:cTn id="20" fill="hold">
+                      <p:stCondLst>
+                        <p:cond delay="indefinite"/>
+                      </p:stCondLst>
+                      <p:childTnLst>
+                        <p:par>
+                          <p:cTn id="21" fill="hold">
+                            <p:stCondLst>
+                              <p:cond delay="0"/>
+                            </p:stCondLst>
+                            <p:childTnLst>
                               <p:par>
-                                <p:cTn id="20" presetID="42" presetClass="entr" presetSubtype="0" fill="hold" grpId="0" nodeType="withEffect">
+                                <p:cTn id="22" presetID="42" presetClass="entr" presetSubtype="0" fill="hold" grpId="0" nodeType="clickEffect">
                                   <p:stCondLst>
                                     <p:cond delay="0"/>
                                   </p:stCondLst>
                                   <p:childTnLst>
                                     <p:set>
                                       <p:cBhvr>
-                                        <p:cTn id="21" dur="1" fill="hold">
+                                        <p:cTn id="23" dur="1" fill="hold">
                                           <p:stCondLst>
                                             <p:cond delay="0"/>
                                           </p:stCondLst>
@@ -9940,7 +9944,7 @@
                                     </p:set>
                                     <p:animEffect transition="in" filter="fade">
                                       <p:cBhvr>
-                                        <p:cTn id="22" dur="1000"/>
+                                        <p:cTn id="24" dur="1000"/>
                                         <p:tgtEl>
                                           <p:spTgt spid="3">
                                             <p:txEl>
@@ -9952,7 +9956,7 @@
                                     </p:animEffect>
                                     <p:anim calcmode="lin" valueType="num">
                                       <p:cBhvr>
-                                        <p:cTn id="23" dur="1000" fill="hold"/>
+                                        <p:cTn id="25" dur="1000" fill="hold"/>
                                         <p:tgtEl>
                                           <p:spTgt spid="3">
                                             <p:txEl>
@@ -9979,7 +9983,7 @@
                                     </p:anim>
                                     <p:anim calcmode="lin" valueType="num">
                                       <p:cBhvr>
-                                        <p:cTn id="24" dur="1000" fill="hold"/>
+                                        <p:cTn id="26" dur="1000" fill="hold"/>
                                         <p:tgtEl>
                                           <p:spTgt spid="3">
                                             <p:txEl>
@@ -10014,26 +10018,26 @@
                     </p:cTn>
                   </p:par>
                   <p:par>
-                    <p:cTn id="25" fill="hold">
+                    <p:cTn id="27" fill="hold">
                       <p:stCondLst>
                         <p:cond delay="indefinite"/>
                       </p:stCondLst>
                       <p:childTnLst>
                         <p:par>
-                          <p:cTn id="26" fill="hold">
+                          <p:cTn id="28" fill="hold">
                             <p:stCondLst>
                               <p:cond delay="0"/>
                             </p:stCondLst>
                             <p:childTnLst>
                               <p:par>
-                                <p:cTn id="27" presetID="42" presetClass="entr" presetSubtype="0" fill="hold" grpId="0" nodeType="clickEffect">
+                                <p:cTn id="29" presetID="42" presetClass="entr" presetSubtype="0" fill="hold" grpId="0" nodeType="clickEffect">
                                   <p:stCondLst>
                                     <p:cond delay="0"/>
                                   </p:stCondLst>
                                   <p:childTnLst>
                                     <p:set>
                                       <p:cBhvr>
-                                        <p:cTn id="28" dur="1" fill="hold">
+                                        <p:cTn id="30" dur="1" fill="hold">
                                           <p:stCondLst>
                                             <p:cond delay="0"/>
                                           </p:stCondLst>
@@ -10055,7 +10059,7 @@
                                     </p:set>
                                     <p:animEffect transition="in" filter="fade">
                                       <p:cBhvr>
-                                        <p:cTn id="29" dur="1000"/>
+                                        <p:cTn id="31" dur="1000"/>
                                         <p:tgtEl>
                                           <p:spTgt spid="3">
                                             <p:txEl>
@@ -10067,7 +10071,7 @@
                                     </p:animEffect>
                                     <p:anim calcmode="lin" valueType="num">
                                       <p:cBhvr>
-                                        <p:cTn id="30" dur="1000" fill="hold"/>
+                                        <p:cTn id="32" dur="1000" fill="hold"/>
                                         <p:tgtEl>
                                           <p:spTgt spid="3">
                                             <p:txEl>
@@ -10094,126 +10098,11 @@
                                     </p:anim>
                                     <p:anim calcmode="lin" valueType="num">
                                       <p:cBhvr>
-                                        <p:cTn id="31" dur="1000" fill="hold"/>
+                                        <p:cTn id="33" dur="1000" fill="hold"/>
                                         <p:tgtEl>
                                           <p:spTgt spid="3">
                                             <p:txEl>
                                               <p:pRg st="4" end="4"/>
-                                            </p:txEl>
-                                          </p:spTgt>
-                                        </p:tgtEl>
-                                        <p:attrNameLst>
-                                          <p:attrName>ppt_y</p:attrName>
-                                        </p:attrNameLst>
-                                      </p:cBhvr>
-                                      <p:tavLst>
-                                        <p:tav tm="0">
-                                          <p:val>
-                                            <p:strVal val="#ppt_y+.1"/>
-                                          </p:val>
-                                        </p:tav>
-                                        <p:tav tm="100000">
-                                          <p:val>
-                                            <p:strVal val="#ppt_y"/>
-                                          </p:val>
-                                        </p:tav>
-                                      </p:tavLst>
-                                    </p:anim>
-                                  </p:childTnLst>
-                                </p:cTn>
-                              </p:par>
-                            </p:childTnLst>
-                          </p:cTn>
-                        </p:par>
-                      </p:childTnLst>
-                    </p:cTn>
-                  </p:par>
-                  <p:par>
-                    <p:cTn id="32" fill="hold">
-                      <p:stCondLst>
-                        <p:cond delay="indefinite"/>
-                      </p:stCondLst>
-                      <p:childTnLst>
-                        <p:par>
-                          <p:cTn id="33" fill="hold">
-                            <p:stCondLst>
-                              <p:cond delay="0"/>
-                            </p:stCondLst>
-                            <p:childTnLst>
-                              <p:par>
-                                <p:cTn id="34" presetID="42" presetClass="entr" presetSubtype="0" fill="hold" grpId="0" nodeType="clickEffect">
-                                  <p:stCondLst>
-                                    <p:cond delay="0"/>
-                                  </p:stCondLst>
-                                  <p:childTnLst>
-                                    <p:set>
-                                      <p:cBhvr>
-                                        <p:cTn id="35" dur="1" fill="hold">
-                                          <p:stCondLst>
-                                            <p:cond delay="0"/>
-                                          </p:stCondLst>
-                                        </p:cTn>
-                                        <p:tgtEl>
-                                          <p:spTgt spid="3">
-                                            <p:txEl>
-                                              <p:pRg st="5" end="5"/>
-                                            </p:txEl>
-                                          </p:spTgt>
-                                        </p:tgtEl>
-                                        <p:attrNameLst>
-                                          <p:attrName>style.visibility</p:attrName>
-                                        </p:attrNameLst>
-                                      </p:cBhvr>
-                                      <p:to>
-                                        <p:strVal val="visible"/>
-                                      </p:to>
-                                    </p:set>
-                                    <p:animEffect transition="in" filter="fade">
-                                      <p:cBhvr>
-                                        <p:cTn id="36" dur="1000"/>
-                                        <p:tgtEl>
-                                          <p:spTgt spid="3">
-                                            <p:txEl>
-                                              <p:pRg st="5" end="5"/>
-                                            </p:txEl>
-                                          </p:spTgt>
-                                        </p:tgtEl>
-                                      </p:cBhvr>
-                                    </p:animEffect>
-                                    <p:anim calcmode="lin" valueType="num">
-                                      <p:cBhvr>
-                                        <p:cTn id="37" dur="1000" fill="hold"/>
-                                        <p:tgtEl>
-                                          <p:spTgt spid="3">
-                                            <p:txEl>
-                                              <p:pRg st="5" end="5"/>
-                                            </p:txEl>
-                                          </p:spTgt>
-                                        </p:tgtEl>
-                                        <p:attrNameLst>
-                                          <p:attrName>ppt_x</p:attrName>
-                                        </p:attrNameLst>
-                                      </p:cBhvr>
-                                      <p:tavLst>
-                                        <p:tav tm="0">
-                                          <p:val>
-                                            <p:strVal val="#ppt_x"/>
-                                          </p:val>
-                                        </p:tav>
-                                        <p:tav tm="100000">
-                                          <p:val>
-                                            <p:strVal val="#ppt_x"/>
-                                          </p:val>
-                                        </p:tav>
-                                      </p:tavLst>
-                                    </p:anim>
-                                    <p:anim calcmode="lin" valueType="num">
-                                      <p:cBhvr>
-                                        <p:cTn id="38" dur="1000" fill="hold"/>
-                                        <p:tgtEl>
-                                          <p:spTgt spid="3">
-                                            <p:txEl>
-                                              <p:pRg st="5" end="5"/>
                                             </p:txEl>
                                           </p:spTgt>
                                         </p:tgtEl>
@@ -10500,11 +10389,11 @@
   <p:clrMapOvr>
     <a:masterClrMapping/>
   </p:clrMapOvr>
-  <mc:AlternateContent xmlns:mc="http://schemas.openxmlformats.org/markup-compatibility/2006">
-    <mc:Choice xmlns:p14="http://schemas.microsoft.com/office/powerpoint/2010/main" Requires="p14">
+  <mc:AlternateContent xmlns:mc="http://schemas.openxmlformats.org/markup-compatibility/2006" xmlns:p14="http://schemas.microsoft.com/office/powerpoint/2010/main">
+    <mc:Choice Requires="p14">
       <p:transition spd="slow" p14:dur="2000"/>
     </mc:Choice>
-    <mc:Fallback>
+    <mc:Fallback xmlns="">
       <p:transition spd="slow"/>
     </mc:Fallback>
   </mc:AlternateContent>

</xml_diff>

<commit_message>
practiced presentation; some corrections
</commit_message>
<xml_diff>
--- a/presentations/Demo DoodleDebug Spring 2013.pptx
+++ b/presentations/Demo DoodleDebug Spring 2013.pptx
@@ -213,7 +213,7 @@
           <a:p>
             <a:fld id="{236ADE3F-CE78-4304-90DD-69CB0597853E}" type="datetimeFigureOut">
               <a:rPr lang="en-US" smtClean="0"/>
-              <a:t>4/28/2013</a:t>
+              <a:t>4/29/2013</a:t>
             </a:fld>
             <a:endParaRPr lang="en-US"/>
           </a:p>
@@ -944,7 +944,7 @@
           <a:p>
             <a:fld id="{85D650DE-3472-4653-A444-5B443FE7AA4E}" type="datetime1">
               <a:rPr lang="de-CH" smtClean="0"/>
-              <a:t>28.04.2013</a:t>
+              <a:t>29.04.2013</a:t>
             </a:fld>
             <a:endParaRPr lang="de-CH" dirty="0"/>
           </a:p>
@@ -1121,7 +1121,7 @@
           <a:p>
             <a:fld id="{8BAC4E3D-F274-4AF5-9DF1-A78FFCEF68DA}" type="datetime1">
               <a:rPr lang="de-CH" smtClean="0"/>
-              <a:t>28.04.2013</a:t>
+              <a:t>29.04.2013</a:t>
             </a:fld>
             <a:endParaRPr lang="de-CH" dirty="0"/>
           </a:p>
@@ -1301,7 +1301,7 @@
           <a:p>
             <a:fld id="{D3964AF6-022E-43B2-9753-57C33D817030}" type="datetime1">
               <a:rPr lang="de-CH" smtClean="0"/>
-              <a:t>28.04.2013</a:t>
+              <a:t>29.04.2013</a:t>
             </a:fld>
             <a:endParaRPr lang="de-CH" dirty="0"/>
           </a:p>
@@ -1656,7 +1656,7 @@
           <a:p>
             <a:fld id="{437327DC-2552-4A52-A1A3-9B5BFACF3DEF}" type="datetime1">
               <a:rPr lang="de-CH" smtClean="0"/>
-              <a:t>28.04.2013</a:t>
+              <a:t>29.04.2013</a:t>
             </a:fld>
             <a:endParaRPr lang="de-CH" dirty="0"/>
           </a:p>
@@ -1909,7 +1909,7 @@
           <a:p>
             <a:fld id="{7A4171FB-593E-465D-9207-2119903B863E}" type="datetime1">
               <a:rPr lang="de-CH" smtClean="0"/>
-              <a:t>28.04.2013</a:t>
+              <a:t>29.04.2013</a:t>
             </a:fld>
             <a:endParaRPr lang="de-CH" dirty="0"/>
           </a:p>
@@ -2204,7 +2204,7 @@
           <a:p>
             <a:fld id="{BD636A4B-8FF2-43A3-B5BD-A9C3C87E2820}" type="datetime1">
               <a:rPr lang="de-CH" smtClean="0"/>
-              <a:t>28.04.2013</a:t>
+              <a:t>29.04.2013</a:t>
             </a:fld>
             <a:endParaRPr lang="de-CH" dirty="0"/>
           </a:p>
@@ -2626,7 +2626,7 @@
           <a:p>
             <a:fld id="{D77D123E-E927-4D73-B43F-B83145EC633F}" type="datetime1">
               <a:rPr lang="de-CH" smtClean="0"/>
-              <a:t>28.04.2013</a:t>
+              <a:t>29.04.2013</a:t>
             </a:fld>
             <a:endParaRPr lang="de-CH" dirty="0"/>
           </a:p>
@@ -2744,7 +2744,7 @@
           <a:p>
             <a:fld id="{F96081AB-9B45-4EA4-85E7-C7D9AE8BCC30}" type="datetime1">
               <a:rPr lang="de-CH" smtClean="0"/>
-              <a:t>28.04.2013</a:t>
+              <a:t>29.04.2013</a:t>
             </a:fld>
             <a:endParaRPr lang="de-CH" dirty="0"/>
           </a:p>
@@ -2839,7 +2839,7 @@
           <a:p>
             <a:fld id="{1B775301-90B7-4097-BBF9-5E4AF869C7A1}" type="datetime1">
               <a:rPr lang="de-CH" smtClean="0"/>
-              <a:t>28.04.2013</a:t>
+              <a:t>29.04.2013</a:t>
             </a:fld>
             <a:endParaRPr lang="de-CH" dirty="0"/>
           </a:p>
@@ -3116,7 +3116,7 @@
           <a:p>
             <a:fld id="{D7A7FEA8-F11E-4DD5-93BD-B1E529D9AFFF}" type="datetime1">
               <a:rPr lang="de-CH" smtClean="0"/>
-              <a:t>28.04.2013</a:t>
+              <a:t>29.04.2013</a:t>
             </a:fld>
             <a:endParaRPr lang="de-CH" dirty="0"/>
           </a:p>
@@ -3369,7 +3369,7 @@
           <a:p>
             <a:fld id="{C2B89150-C15F-4D6A-BF1B-40AA2F4AABBB}" type="datetime1">
               <a:rPr lang="de-CH" smtClean="0"/>
-              <a:t>28.04.2013</a:t>
+              <a:t>29.04.2013</a:t>
             </a:fld>
             <a:endParaRPr lang="de-CH" dirty="0"/>
           </a:p>
@@ -3582,7 +3582,7 @@
           <a:p>
             <a:fld id="{E65CC87D-290B-4A82-A5FC-87C0639762FA}" type="datetime1">
               <a:rPr lang="de-CH" smtClean="0"/>
-              <a:t>28.04.2013</a:t>
+              <a:t>29.04.2013</a:t>
             </a:fld>
             <a:endParaRPr lang="de-CH" dirty="0"/>
           </a:p>
@@ -9486,7 +9486,6 @@
               <a:rPr lang="en-US" dirty="0" smtClean="0"/>
               <a:t>Faster problem detection</a:t>
             </a:r>
-            <a:endParaRPr lang="en-US" dirty="0" smtClean="0"/>
           </a:p>
           <a:p>
             <a:pPr lvl="1"/>
@@ -9537,13 +9536,7 @@
               <a:rPr lang="en-US" dirty="0" smtClean="0">
                 <a:sym typeface="Wingdings" pitchFamily="2" charset="2"/>
               </a:rPr>
-              <a:t>Several </a:t>
-            </a:r>
-            <a:r>
-              <a:rPr lang="en-US" dirty="0" smtClean="0">
-                <a:sym typeface="Wingdings" pitchFamily="2" charset="2"/>
-              </a:rPr>
-              <a:t>minor UI problems</a:t>
+              <a:t>Several minor UI problems</a:t>
             </a:r>
             <a:endParaRPr lang="en-US" dirty="0"/>
           </a:p>

</xml_diff>

<commit_message>
small fixes on scg demo
</commit_message>
<xml_diff>
--- a/presentations/Demo DoodleDebug Spring 2013.pptx
+++ b/presentations/Demo DoodleDebug Spring 2013.pptx
@@ -4089,6 +4089,54 @@
           </a:extLst>
         </p:spPr>
       </p:pic>
+      <p:sp>
+        <p:nvSpPr>
+          <p:cNvPr id="2" name="Textfeld 1"/>
+          <p:cNvSpPr txBox="1"/>
+          <p:nvPr/>
+        </p:nvSpPr>
+        <p:spPr>
+          <a:xfrm>
+            <a:off x="0" y="6488668"/>
+            <a:ext cx="5148064" cy="369332"/>
+          </a:xfrm>
+          <a:prstGeom prst="rect">
+            <a:avLst/>
+          </a:prstGeom>
+          <a:noFill/>
+        </p:spPr>
+        <p:txBody>
+          <a:bodyPr wrap="square" rtlCol="0">
+            <a:spAutoFit/>
+          </a:bodyPr>
+          <a:lstStyle/>
+          <a:p>
+            <a:r>
+              <a:rPr lang="en-US" dirty="0">
+                <a:solidFill>
+                  <a:srgbClr val="0066FF"/>
+                </a:solidFill>
+                <a:hlinkClick r:id="rId4"/>
+              </a:rPr>
+              <a:t>http://</a:t>
+            </a:r>
+            <a:r>
+              <a:rPr lang="en-US" dirty="0" smtClean="0">
+                <a:solidFill>
+                  <a:srgbClr val="0066FF"/>
+                </a:solidFill>
+                <a:hlinkClick r:id="rId4"/>
+              </a:rPr>
+              <a:t>scg.unibe.ch/wiki/projects/DoodleDebug</a:t>
+            </a:r>
+            <a:endParaRPr lang="en-US" dirty="0">
+              <a:solidFill>
+                <a:srgbClr val="0066FF"/>
+              </a:solidFill>
+            </a:endParaRPr>
+          </a:p>
+        </p:txBody>
+      </p:sp>
     </p:spTree>
     <p:extLst>
       <p:ext uri="{BB962C8B-B14F-4D97-AF65-F5344CB8AC3E}">
@@ -11423,9 +11471,235 @@
   <p:timing>
     <p:tnLst>
       <p:par>
-        <p:cTn id="1" dur="indefinite" restart="never" nodeType="tmRoot"/>
+        <p:cTn id="1" dur="indefinite" restart="never" nodeType="tmRoot">
+          <p:childTnLst>
+            <p:seq concurrent="1" nextAc="seek">
+              <p:cTn id="2" dur="indefinite" nodeType="mainSeq">
+                <p:childTnLst>
+                  <p:par>
+                    <p:cTn id="3" fill="hold">
+                      <p:stCondLst>
+                        <p:cond delay="indefinite"/>
+                        <p:cond evt="onBegin" delay="0">
+                          <p:tn val="2"/>
+                        </p:cond>
+                      </p:stCondLst>
+                      <p:childTnLst>
+                        <p:par>
+                          <p:cTn id="4" fill="hold">
+                            <p:stCondLst>
+                              <p:cond delay="0"/>
+                            </p:stCondLst>
+                            <p:childTnLst>
+                              <p:par>
+                                <p:cTn id="5" presetID="42" presetClass="entr" presetSubtype="0" fill="hold" grpId="0" nodeType="withEffect">
+                                  <p:stCondLst>
+                                    <p:cond delay="0"/>
+                                  </p:stCondLst>
+                                  <p:childTnLst>
+                                    <p:set>
+                                      <p:cBhvr>
+                                        <p:cTn id="6" dur="1" fill="hold">
+                                          <p:stCondLst>
+                                            <p:cond delay="0"/>
+                                          </p:stCondLst>
+                                        </p:cTn>
+                                        <p:tgtEl>
+                                          <p:spTgt spid="3">
+                                            <p:txEl>
+                                              <p:pRg st="0" end="0"/>
+                                            </p:txEl>
+                                          </p:spTgt>
+                                        </p:tgtEl>
+                                        <p:attrNameLst>
+                                          <p:attrName>style.visibility</p:attrName>
+                                        </p:attrNameLst>
+                                      </p:cBhvr>
+                                      <p:to>
+                                        <p:strVal val="visible"/>
+                                      </p:to>
+                                    </p:set>
+                                    <p:animEffect transition="in" filter="fade">
+                                      <p:cBhvr>
+                                        <p:cTn id="7" dur="1000"/>
+                                        <p:tgtEl>
+                                          <p:spTgt spid="3">
+                                            <p:txEl>
+                                              <p:pRg st="0" end="0"/>
+                                            </p:txEl>
+                                          </p:spTgt>
+                                        </p:tgtEl>
+                                      </p:cBhvr>
+                                    </p:animEffect>
+                                    <p:anim calcmode="lin" valueType="num">
+                                      <p:cBhvr>
+                                        <p:cTn id="8" dur="1000" fill="hold"/>
+                                        <p:tgtEl>
+                                          <p:spTgt spid="3">
+                                            <p:txEl>
+                                              <p:pRg st="0" end="0"/>
+                                            </p:txEl>
+                                          </p:spTgt>
+                                        </p:tgtEl>
+                                        <p:attrNameLst>
+                                          <p:attrName>ppt_x</p:attrName>
+                                        </p:attrNameLst>
+                                      </p:cBhvr>
+                                      <p:tavLst>
+                                        <p:tav tm="0">
+                                          <p:val>
+                                            <p:strVal val="#ppt_x"/>
+                                          </p:val>
+                                        </p:tav>
+                                        <p:tav tm="100000">
+                                          <p:val>
+                                            <p:strVal val="#ppt_x"/>
+                                          </p:val>
+                                        </p:tav>
+                                      </p:tavLst>
+                                    </p:anim>
+                                    <p:anim calcmode="lin" valueType="num">
+                                      <p:cBhvr>
+                                        <p:cTn id="9" dur="1000" fill="hold"/>
+                                        <p:tgtEl>
+                                          <p:spTgt spid="3">
+                                            <p:txEl>
+                                              <p:pRg st="0" end="0"/>
+                                            </p:txEl>
+                                          </p:spTgt>
+                                        </p:tgtEl>
+                                        <p:attrNameLst>
+                                          <p:attrName>ppt_y</p:attrName>
+                                        </p:attrNameLst>
+                                      </p:cBhvr>
+                                      <p:tavLst>
+                                        <p:tav tm="0">
+                                          <p:val>
+                                            <p:strVal val="#ppt_y+.1"/>
+                                          </p:val>
+                                        </p:tav>
+                                        <p:tav tm="100000">
+                                          <p:val>
+                                            <p:strVal val="#ppt_y"/>
+                                          </p:val>
+                                        </p:tav>
+                                      </p:tavLst>
+                                    </p:anim>
+                                  </p:childTnLst>
+                                </p:cTn>
+                              </p:par>
+                              <p:par>
+                                <p:cTn id="10" presetID="42" presetClass="entr" presetSubtype="0" fill="hold" grpId="0" nodeType="withEffect">
+                                  <p:stCondLst>
+                                    <p:cond delay="0"/>
+                                  </p:stCondLst>
+                                  <p:childTnLst>
+                                    <p:set>
+                                      <p:cBhvr>
+                                        <p:cTn id="11" dur="1" fill="hold">
+                                          <p:stCondLst>
+                                            <p:cond delay="0"/>
+                                          </p:stCondLst>
+                                        </p:cTn>
+                                        <p:tgtEl>
+                                          <p:spTgt spid="6"/>
+                                        </p:tgtEl>
+                                        <p:attrNameLst>
+                                          <p:attrName>style.visibility</p:attrName>
+                                        </p:attrNameLst>
+                                      </p:cBhvr>
+                                      <p:to>
+                                        <p:strVal val="visible"/>
+                                      </p:to>
+                                    </p:set>
+                                    <p:animEffect transition="in" filter="fade">
+                                      <p:cBhvr>
+                                        <p:cTn id="12" dur="1000"/>
+                                        <p:tgtEl>
+                                          <p:spTgt spid="6"/>
+                                        </p:tgtEl>
+                                      </p:cBhvr>
+                                    </p:animEffect>
+                                    <p:anim calcmode="lin" valueType="num">
+                                      <p:cBhvr>
+                                        <p:cTn id="13" dur="1000" fill="hold"/>
+                                        <p:tgtEl>
+                                          <p:spTgt spid="6"/>
+                                        </p:tgtEl>
+                                        <p:attrNameLst>
+                                          <p:attrName>ppt_x</p:attrName>
+                                        </p:attrNameLst>
+                                      </p:cBhvr>
+                                      <p:tavLst>
+                                        <p:tav tm="0">
+                                          <p:val>
+                                            <p:strVal val="#ppt_x"/>
+                                          </p:val>
+                                        </p:tav>
+                                        <p:tav tm="100000">
+                                          <p:val>
+                                            <p:strVal val="#ppt_x"/>
+                                          </p:val>
+                                        </p:tav>
+                                      </p:tavLst>
+                                    </p:anim>
+                                    <p:anim calcmode="lin" valueType="num">
+                                      <p:cBhvr>
+                                        <p:cTn id="14" dur="1000" fill="hold"/>
+                                        <p:tgtEl>
+                                          <p:spTgt spid="6"/>
+                                        </p:tgtEl>
+                                        <p:attrNameLst>
+                                          <p:attrName>ppt_y</p:attrName>
+                                        </p:attrNameLst>
+                                      </p:cBhvr>
+                                      <p:tavLst>
+                                        <p:tav tm="0">
+                                          <p:val>
+                                            <p:strVal val="#ppt_y+.1"/>
+                                          </p:val>
+                                        </p:tav>
+                                        <p:tav tm="100000">
+                                          <p:val>
+                                            <p:strVal val="#ppt_y"/>
+                                          </p:val>
+                                        </p:tav>
+                                      </p:tavLst>
+                                    </p:anim>
+                                  </p:childTnLst>
+                                </p:cTn>
+                              </p:par>
+                            </p:childTnLst>
+                          </p:cTn>
+                        </p:par>
+                      </p:childTnLst>
+                    </p:cTn>
+                  </p:par>
+                </p:childTnLst>
+              </p:cTn>
+              <p:prevCondLst>
+                <p:cond evt="onPrev" delay="0">
+                  <p:tgtEl>
+                    <p:sldTgt/>
+                  </p:tgtEl>
+                </p:cond>
+              </p:prevCondLst>
+              <p:nextCondLst>
+                <p:cond evt="onNext" delay="0">
+                  <p:tgtEl>
+                    <p:sldTgt/>
+                  </p:tgtEl>
+                </p:cond>
+              </p:nextCondLst>
+            </p:seq>
+          </p:childTnLst>
+        </p:cTn>
       </p:par>
     </p:tnLst>
+    <p:bldLst>
+      <p:bldP spid="3" grpId="0" build="p"/>
+      <p:bldP spid="6" grpId="0"/>
+    </p:bldLst>
   </p:timing>
 </p:sld>
 </file>
@@ -11964,9 +12238,1399 @@
   <p:timing>
     <p:tnLst>
       <p:par>
-        <p:cTn id="1" dur="indefinite" restart="never" nodeType="tmRoot"/>
+        <p:cTn id="1" dur="indefinite" restart="never" nodeType="tmRoot">
+          <p:childTnLst>
+            <p:seq concurrent="1" nextAc="seek">
+              <p:cTn id="2" dur="indefinite" nodeType="mainSeq">
+                <p:childTnLst>
+                  <p:par>
+                    <p:cTn id="3" fill="hold">
+                      <p:stCondLst>
+                        <p:cond delay="indefinite"/>
+                        <p:cond evt="onBegin" delay="0">
+                          <p:tn val="2"/>
+                        </p:cond>
+                      </p:stCondLst>
+                      <p:childTnLst>
+                        <p:par>
+                          <p:cTn id="4" fill="hold">
+                            <p:stCondLst>
+                              <p:cond delay="0"/>
+                            </p:stCondLst>
+                            <p:childTnLst>
+                              <p:par>
+                                <p:cTn id="5" presetID="42" presetClass="entr" presetSubtype="0" fill="hold" grpId="0" nodeType="withEffect">
+                                  <p:stCondLst>
+                                    <p:cond delay="0"/>
+                                  </p:stCondLst>
+                                  <p:childTnLst>
+                                    <p:set>
+                                      <p:cBhvr>
+                                        <p:cTn id="6" dur="1" fill="hold">
+                                          <p:stCondLst>
+                                            <p:cond delay="0"/>
+                                          </p:stCondLst>
+                                        </p:cTn>
+                                        <p:tgtEl>
+                                          <p:spTgt spid="6"/>
+                                        </p:tgtEl>
+                                        <p:attrNameLst>
+                                          <p:attrName>style.visibility</p:attrName>
+                                        </p:attrNameLst>
+                                      </p:cBhvr>
+                                      <p:to>
+                                        <p:strVal val="visible"/>
+                                      </p:to>
+                                    </p:set>
+                                    <p:animEffect transition="in" filter="fade">
+                                      <p:cBhvr>
+                                        <p:cTn id="7" dur="1000"/>
+                                        <p:tgtEl>
+                                          <p:spTgt spid="6"/>
+                                        </p:tgtEl>
+                                      </p:cBhvr>
+                                    </p:animEffect>
+                                    <p:anim calcmode="lin" valueType="num">
+                                      <p:cBhvr>
+                                        <p:cTn id="8" dur="1000" fill="hold"/>
+                                        <p:tgtEl>
+                                          <p:spTgt spid="6"/>
+                                        </p:tgtEl>
+                                        <p:attrNameLst>
+                                          <p:attrName>ppt_x</p:attrName>
+                                        </p:attrNameLst>
+                                      </p:cBhvr>
+                                      <p:tavLst>
+                                        <p:tav tm="0">
+                                          <p:val>
+                                            <p:strVal val="#ppt_x"/>
+                                          </p:val>
+                                        </p:tav>
+                                        <p:tav tm="100000">
+                                          <p:val>
+                                            <p:strVal val="#ppt_x"/>
+                                          </p:val>
+                                        </p:tav>
+                                      </p:tavLst>
+                                    </p:anim>
+                                    <p:anim calcmode="lin" valueType="num">
+                                      <p:cBhvr>
+                                        <p:cTn id="9" dur="1000" fill="hold"/>
+                                        <p:tgtEl>
+                                          <p:spTgt spid="6"/>
+                                        </p:tgtEl>
+                                        <p:attrNameLst>
+                                          <p:attrName>ppt_y</p:attrName>
+                                        </p:attrNameLst>
+                                      </p:cBhvr>
+                                      <p:tavLst>
+                                        <p:tav tm="0">
+                                          <p:val>
+                                            <p:strVal val="#ppt_y+.1"/>
+                                          </p:val>
+                                        </p:tav>
+                                        <p:tav tm="100000">
+                                          <p:val>
+                                            <p:strVal val="#ppt_y"/>
+                                          </p:val>
+                                        </p:tav>
+                                      </p:tavLst>
+                                    </p:anim>
+                                  </p:childTnLst>
+                                </p:cTn>
+                              </p:par>
+                              <p:par>
+                                <p:cTn id="10" presetID="42" presetClass="entr" presetSubtype="0" fill="hold" grpId="0" nodeType="withEffect">
+                                  <p:stCondLst>
+                                    <p:cond delay="0"/>
+                                  </p:stCondLst>
+                                  <p:childTnLst>
+                                    <p:set>
+                                      <p:cBhvr>
+                                        <p:cTn id="11" dur="1" fill="hold">
+                                          <p:stCondLst>
+                                            <p:cond delay="0"/>
+                                          </p:stCondLst>
+                                        </p:cTn>
+                                        <p:tgtEl>
+                                          <p:spTgt spid="3">
+                                            <p:txEl>
+                                              <p:pRg st="0" end="0"/>
+                                            </p:txEl>
+                                          </p:spTgt>
+                                        </p:tgtEl>
+                                        <p:attrNameLst>
+                                          <p:attrName>style.visibility</p:attrName>
+                                        </p:attrNameLst>
+                                      </p:cBhvr>
+                                      <p:to>
+                                        <p:strVal val="visible"/>
+                                      </p:to>
+                                    </p:set>
+                                    <p:animEffect transition="in" filter="fade">
+                                      <p:cBhvr>
+                                        <p:cTn id="12" dur="1000"/>
+                                        <p:tgtEl>
+                                          <p:spTgt spid="3">
+                                            <p:txEl>
+                                              <p:pRg st="0" end="0"/>
+                                            </p:txEl>
+                                          </p:spTgt>
+                                        </p:tgtEl>
+                                      </p:cBhvr>
+                                    </p:animEffect>
+                                    <p:anim calcmode="lin" valueType="num">
+                                      <p:cBhvr>
+                                        <p:cTn id="13" dur="1000" fill="hold"/>
+                                        <p:tgtEl>
+                                          <p:spTgt spid="3">
+                                            <p:txEl>
+                                              <p:pRg st="0" end="0"/>
+                                            </p:txEl>
+                                          </p:spTgt>
+                                        </p:tgtEl>
+                                        <p:attrNameLst>
+                                          <p:attrName>ppt_x</p:attrName>
+                                        </p:attrNameLst>
+                                      </p:cBhvr>
+                                      <p:tavLst>
+                                        <p:tav tm="0">
+                                          <p:val>
+                                            <p:strVal val="#ppt_x"/>
+                                          </p:val>
+                                        </p:tav>
+                                        <p:tav tm="100000">
+                                          <p:val>
+                                            <p:strVal val="#ppt_x"/>
+                                          </p:val>
+                                        </p:tav>
+                                      </p:tavLst>
+                                    </p:anim>
+                                    <p:anim calcmode="lin" valueType="num">
+                                      <p:cBhvr>
+                                        <p:cTn id="14" dur="1000" fill="hold"/>
+                                        <p:tgtEl>
+                                          <p:spTgt spid="3">
+                                            <p:txEl>
+                                              <p:pRg st="0" end="0"/>
+                                            </p:txEl>
+                                          </p:spTgt>
+                                        </p:tgtEl>
+                                        <p:attrNameLst>
+                                          <p:attrName>ppt_y</p:attrName>
+                                        </p:attrNameLst>
+                                      </p:cBhvr>
+                                      <p:tavLst>
+                                        <p:tav tm="0">
+                                          <p:val>
+                                            <p:strVal val="#ppt_y+.1"/>
+                                          </p:val>
+                                        </p:tav>
+                                        <p:tav tm="100000">
+                                          <p:val>
+                                            <p:strVal val="#ppt_y"/>
+                                          </p:val>
+                                        </p:tav>
+                                      </p:tavLst>
+                                    </p:anim>
+                                  </p:childTnLst>
+                                </p:cTn>
+                              </p:par>
+                              <p:par>
+                                <p:cTn id="15" presetID="42" presetClass="entr" presetSubtype="0" fill="hold" grpId="0" nodeType="withEffect">
+                                  <p:stCondLst>
+                                    <p:cond delay="0"/>
+                                  </p:stCondLst>
+                                  <p:childTnLst>
+                                    <p:set>
+                                      <p:cBhvr>
+                                        <p:cTn id="16" dur="1" fill="hold">
+                                          <p:stCondLst>
+                                            <p:cond delay="0"/>
+                                          </p:stCondLst>
+                                        </p:cTn>
+                                        <p:tgtEl>
+                                          <p:spTgt spid="3">
+                                            <p:txEl>
+                                              <p:pRg st="1" end="1"/>
+                                            </p:txEl>
+                                          </p:spTgt>
+                                        </p:tgtEl>
+                                        <p:attrNameLst>
+                                          <p:attrName>style.visibility</p:attrName>
+                                        </p:attrNameLst>
+                                      </p:cBhvr>
+                                      <p:to>
+                                        <p:strVal val="visible"/>
+                                      </p:to>
+                                    </p:set>
+                                    <p:animEffect transition="in" filter="fade">
+                                      <p:cBhvr>
+                                        <p:cTn id="17" dur="1000"/>
+                                        <p:tgtEl>
+                                          <p:spTgt spid="3">
+                                            <p:txEl>
+                                              <p:pRg st="1" end="1"/>
+                                            </p:txEl>
+                                          </p:spTgt>
+                                        </p:tgtEl>
+                                      </p:cBhvr>
+                                    </p:animEffect>
+                                    <p:anim calcmode="lin" valueType="num">
+                                      <p:cBhvr>
+                                        <p:cTn id="18" dur="1000" fill="hold"/>
+                                        <p:tgtEl>
+                                          <p:spTgt spid="3">
+                                            <p:txEl>
+                                              <p:pRg st="1" end="1"/>
+                                            </p:txEl>
+                                          </p:spTgt>
+                                        </p:tgtEl>
+                                        <p:attrNameLst>
+                                          <p:attrName>ppt_x</p:attrName>
+                                        </p:attrNameLst>
+                                      </p:cBhvr>
+                                      <p:tavLst>
+                                        <p:tav tm="0">
+                                          <p:val>
+                                            <p:strVal val="#ppt_x"/>
+                                          </p:val>
+                                        </p:tav>
+                                        <p:tav tm="100000">
+                                          <p:val>
+                                            <p:strVal val="#ppt_x"/>
+                                          </p:val>
+                                        </p:tav>
+                                      </p:tavLst>
+                                    </p:anim>
+                                    <p:anim calcmode="lin" valueType="num">
+                                      <p:cBhvr>
+                                        <p:cTn id="19" dur="1000" fill="hold"/>
+                                        <p:tgtEl>
+                                          <p:spTgt spid="3">
+                                            <p:txEl>
+                                              <p:pRg st="1" end="1"/>
+                                            </p:txEl>
+                                          </p:spTgt>
+                                        </p:tgtEl>
+                                        <p:attrNameLst>
+                                          <p:attrName>ppt_y</p:attrName>
+                                        </p:attrNameLst>
+                                      </p:cBhvr>
+                                      <p:tavLst>
+                                        <p:tav tm="0">
+                                          <p:val>
+                                            <p:strVal val="#ppt_y+.1"/>
+                                          </p:val>
+                                        </p:tav>
+                                        <p:tav tm="100000">
+                                          <p:val>
+                                            <p:strVal val="#ppt_y"/>
+                                          </p:val>
+                                        </p:tav>
+                                      </p:tavLst>
+                                    </p:anim>
+                                  </p:childTnLst>
+                                </p:cTn>
+                              </p:par>
+                              <p:par>
+                                <p:cTn id="20" presetID="42" presetClass="entr" presetSubtype="0" fill="hold" grpId="0" nodeType="withEffect">
+                                  <p:stCondLst>
+                                    <p:cond delay="0"/>
+                                  </p:stCondLst>
+                                  <p:childTnLst>
+                                    <p:set>
+                                      <p:cBhvr>
+                                        <p:cTn id="21" dur="1" fill="hold">
+                                          <p:stCondLst>
+                                            <p:cond delay="0"/>
+                                          </p:stCondLst>
+                                        </p:cTn>
+                                        <p:tgtEl>
+                                          <p:spTgt spid="3">
+                                            <p:txEl>
+                                              <p:pRg st="2" end="2"/>
+                                            </p:txEl>
+                                          </p:spTgt>
+                                        </p:tgtEl>
+                                        <p:attrNameLst>
+                                          <p:attrName>style.visibility</p:attrName>
+                                        </p:attrNameLst>
+                                      </p:cBhvr>
+                                      <p:to>
+                                        <p:strVal val="visible"/>
+                                      </p:to>
+                                    </p:set>
+                                    <p:animEffect transition="in" filter="fade">
+                                      <p:cBhvr>
+                                        <p:cTn id="22" dur="1000"/>
+                                        <p:tgtEl>
+                                          <p:spTgt spid="3">
+                                            <p:txEl>
+                                              <p:pRg st="2" end="2"/>
+                                            </p:txEl>
+                                          </p:spTgt>
+                                        </p:tgtEl>
+                                      </p:cBhvr>
+                                    </p:animEffect>
+                                    <p:anim calcmode="lin" valueType="num">
+                                      <p:cBhvr>
+                                        <p:cTn id="23" dur="1000" fill="hold"/>
+                                        <p:tgtEl>
+                                          <p:spTgt spid="3">
+                                            <p:txEl>
+                                              <p:pRg st="2" end="2"/>
+                                            </p:txEl>
+                                          </p:spTgt>
+                                        </p:tgtEl>
+                                        <p:attrNameLst>
+                                          <p:attrName>ppt_x</p:attrName>
+                                        </p:attrNameLst>
+                                      </p:cBhvr>
+                                      <p:tavLst>
+                                        <p:tav tm="0">
+                                          <p:val>
+                                            <p:strVal val="#ppt_x"/>
+                                          </p:val>
+                                        </p:tav>
+                                        <p:tav tm="100000">
+                                          <p:val>
+                                            <p:strVal val="#ppt_x"/>
+                                          </p:val>
+                                        </p:tav>
+                                      </p:tavLst>
+                                    </p:anim>
+                                    <p:anim calcmode="lin" valueType="num">
+                                      <p:cBhvr>
+                                        <p:cTn id="24" dur="1000" fill="hold"/>
+                                        <p:tgtEl>
+                                          <p:spTgt spid="3">
+                                            <p:txEl>
+                                              <p:pRg st="2" end="2"/>
+                                            </p:txEl>
+                                          </p:spTgt>
+                                        </p:tgtEl>
+                                        <p:attrNameLst>
+                                          <p:attrName>ppt_y</p:attrName>
+                                        </p:attrNameLst>
+                                      </p:cBhvr>
+                                      <p:tavLst>
+                                        <p:tav tm="0">
+                                          <p:val>
+                                            <p:strVal val="#ppt_y+.1"/>
+                                          </p:val>
+                                        </p:tav>
+                                        <p:tav tm="100000">
+                                          <p:val>
+                                            <p:strVal val="#ppt_y"/>
+                                          </p:val>
+                                        </p:tav>
+                                      </p:tavLst>
+                                    </p:anim>
+                                  </p:childTnLst>
+                                </p:cTn>
+                              </p:par>
+                              <p:par>
+                                <p:cTn id="25" presetID="42" presetClass="entr" presetSubtype="0" fill="hold" grpId="0" nodeType="withEffect">
+                                  <p:stCondLst>
+                                    <p:cond delay="0"/>
+                                  </p:stCondLst>
+                                  <p:childTnLst>
+                                    <p:set>
+                                      <p:cBhvr>
+                                        <p:cTn id="26" dur="1" fill="hold">
+                                          <p:stCondLst>
+                                            <p:cond delay="0"/>
+                                          </p:stCondLst>
+                                        </p:cTn>
+                                        <p:tgtEl>
+                                          <p:spTgt spid="3">
+                                            <p:txEl>
+                                              <p:pRg st="3" end="3"/>
+                                            </p:txEl>
+                                          </p:spTgt>
+                                        </p:tgtEl>
+                                        <p:attrNameLst>
+                                          <p:attrName>style.visibility</p:attrName>
+                                        </p:attrNameLst>
+                                      </p:cBhvr>
+                                      <p:to>
+                                        <p:strVal val="visible"/>
+                                      </p:to>
+                                    </p:set>
+                                    <p:animEffect transition="in" filter="fade">
+                                      <p:cBhvr>
+                                        <p:cTn id="27" dur="1000"/>
+                                        <p:tgtEl>
+                                          <p:spTgt spid="3">
+                                            <p:txEl>
+                                              <p:pRg st="3" end="3"/>
+                                            </p:txEl>
+                                          </p:spTgt>
+                                        </p:tgtEl>
+                                      </p:cBhvr>
+                                    </p:animEffect>
+                                    <p:anim calcmode="lin" valueType="num">
+                                      <p:cBhvr>
+                                        <p:cTn id="28" dur="1000" fill="hold"/>
+                                        <p:tgtEl>
+                                          <p:spTgt spid="3">
+                                            <p:txEl>
+                                              <p:pRg st="3" end="3"/>
+                                            </p:txEl>
+                                          </p:spTgt>
+                                        </p:tgtEl>
+                                        <p:attrNameLst>
+                                          <p:attrName>ppt_x</p:attrName>
+                                        </p:attrNameLst>
+                                      </p:cBhvr>
+                                      <p:tavLst>
+                                        <p:tav tm="0">
+                                          <p:val>
+                                            <p:strVal val="#ppt_x"/>
+                                          </p:val>
+                                        </p:tav>
+                                        <p:tav tm="100000">
+                                          <p:val>
+                                            <p:strVal val="#ppt_x"/>
+                                          </p:val>
+                                        </p:tav>
+                                      </p:tavLst>
+                                    </p:anim>
+                                    <p:anim calcmode="lin" valueType="num">
+                                      <p:cBhvr>
+                                        <p:cTn id="29" dur="1000" fill="hold"/>
+                                        <p:tgtEl>
+                                          <p:spTgt spid="3">
+                                            <p:txEl>
+                                              <p:pRg st="3" end="3"/>
+                                            </p:txEl>
+                                          </p:spTgt>
+                                        </p:tgtEl>
+                                        <p:attrNameLst>
+                                          <p:attrName>ppt_y</p:attrName>
+                                        </p:attrNameLst>
+                                      </p:cBhvr>
+                                      <p:tavLst>
+                                        <p:tav tm="0">
+                                          <p:val>
+                                            <p:strVal val="#ppt_y+.1"/>
+                                          </p:val>
+                                        </p:tav>
+                                        <p:tav tm="100000">
+                                          <p:val>
+                                            <p:strVal val="#ppt_y"/>
+                                          </p:val>
+                                        </p:tav>
+                                      </p:tavLst>
+                                    </p:anim>
+                                  </p:childTnLst>
+                                </p:cTn>
+                              </p:par>
+                              <p:par>
+                                <p:cTn id="30" presetID="42" presetClass="entr" presetSubtype="0" fill="hold" grpId="0" nodeType="withEffect">
+                                  <p:stCondLst>
+                                    <p:cond delay="0"/>
+                                  </p:stCondLst>
+                                  <p:childTnLst>
+                                    <p:set>
+                                      <p:cBhvr>
+                                        <p:cTn id="31" dur="1" fill="hold">
+                                          <p:stCondLst>
+                                            <p:cond delay="0"/>
+                                          </p:stCondLst>
+                                        </p:cTn>
+                                        <p:tgtEl>
+                                          <p:spTgt spid="3">
+                                            <p:txEl>
+                                              <p:pRg st="4" end="4"/>
+                                            </p:txEl>
+                                          </p:spTgt>
+                                        </p:tgtEl>
+                                        <p:attrNameLst>
+                                          <p:attrName>style.visibility</p:attrName>
+                                        </p:attrNameLst>
+                                      </p:cBhvr>
+                                      <p:to>
+                                        <p:strVal val="visible"/>
+                                      </p:to>
+                                    </p:set>
+                                    <p:animEffect transition="in" filter="fade">
+                                      <p:cBhvr>
+                                        <p:cTn id="32" dur="1000"/>
+                                        <p:tgtEl>
+                                          <p:spTgt spid="3">
+                                            <p:txEl>
+                                              <p:pRg st="4" end="4"/>
+                                            </p:txEl>
+                                          </p:spTgt>
+                                        </p:tgtEl>
+                                      </p:cBhvr>
+                                    </p:animEffect>
+                                    <p:anim calcmode="lin" valueType="num">
+                                      <p:cBhvr>
+                                        <p:cTn id="33" dur="1000" fill="hold"/>
+                                        <p:tgtEl>
+                                          <p:spTgt spid="3">
+                                            <p:txEl>
+                                              <p:pRg st="4" end="4"/>
+                                            </p:txEl>
+                                          </p:spTgt>
+                                        </p:tgtEl>
+                                        <p:attrNameLst>
+                                          <p:attrName>ppt_x</p:attrName>
+                                        </p:attrNameLst>
+                                      </p:cBhvr>
+                                      <p:tavLst>
+                                        <p:tav tm="0">
+                                          <p:val>
+                                            <p:strVal val="#ppt_x"/>
+                                          </p:val>
+                                        </p:tav>
+                                        <p:tav tm="100000">
+                                          <p:val>
+                                            <p:strVal val="#ppt_x"/>
+                                          </p:val>
+                                        </p:tav>
+                                      </p:tavLst>
+                                    </p:anim>
+                                    <p:anim calcmode="lin" valueType="num">
+                                      <p:cBhvr>
+                                        <p:cTn id="34" dur="1000" fill="hold"/>
+                                        <p:tgtEl>
+                                          <p:spTgt spid="3">
+                                            <p:txEl>
+                                              <p:pRg st="4" end="4"/>
+                                            </p:txEl>
+                                          </p:spTgt>
+                                        </p:tgtEl>
+                                        <p:attrNameLst>
+                                          <p:attrName>ppt_y</p:attrName>
+                                        </p:attrNameLst>
+                                      </p:cBhvr>
+                                      <p:tavLst>
+                                        <p:tav tm="0">
+                                          <p:val>
+                                            <p:strVal val="#ppt_y+.1"/>
+                                          </p:val>
+                                        </p:tav>
+                                        <p:tav tm="100000">
+                                          <p:val>
+                                            <p:strVal val="#ppt_y"/>
+                                          </p:val>
+                                        </p:tav>
+                                      </p:tavLst>
+                                    </p:anim>
+                                  </p:childTnLst>
+                                </p:cTn>
+                              </p:par>
+                              <p:par>
+                                <p:cTn id="35" presetID="42" presetClass="entr" presetSubtype="0" fill="hold" grpId="0" nodeType="withEffect">
+                                  <p:stCondLst>
+                                    <p:cond delay="0"/>
+                                  </p:stCondLst>
+                                  <p:childTnLst>
+                                    <p:set>
+                                      <p:cBhvr>
+                                        <p:cTn id="36" dur="1" fill="hold">
+                                          <p:stCondLst>
+                                            <p:cond delay="0"/>
+                                          </p:stCondLst>
+                                        </p:cTn>
+                                        <p:tgtEl>
+                                          <p:spTgt spid="3">
+                                            <p:txEl>
+                                              <p:pRg st="5" end="5"/>
+                                            </p:txEl>
+                                          </p:spTgt>
+                                        </p:tgtEl>
+                                        <p:attrNameLst>
+                                          <p:attrName>style.visibility</p:attrName>
+                                        </p:attrNameLst>
+                                      </p:cBhvr>
+                                      <p:to>
+                                        <p:strVal val="visible"/>
+                                      </p:to>
+                                    </p:set>
+                                    <p:animEffect transition="in" filter="fade">
+                                      <p:cBhvr>
+                                        <p:cTn id="37" dur="1000"/>
+                                        <p:tgtEl>
+                                          <p:spTgt spid="3">
+                                            <p:txEl>
+                                              <p:pRg st="5" end="5"/>
+                                            </p:txEl>
+                                          </p:spTgt>
+                                        </p:tgtEl>
+                                      </p:cBhvr>
+                                    </p:animEffect>
+                                    <p:anim calcmode="lin" valueType="num">
+                                      <p:cBhvr>
+                                        <p:cTn id="38" dur="1000" fill="hold"/>
+                                        <p:tgtEl>
+                                          <p:spTgt spid="3">
+                                            <p:txEl>
+                                              <p:pRg st="5" end="5"/>
+                                            </p:txEl>
+                                          </p:spTgt>
+                                        </p:tgtEl>
+                                        <p:attrNameLst>
+                                          <p:attrName>ppt_x</p:attrName>
+                                        </p:attrNameLst>
+                                      </p:cBhvr>
+                                      <p:tavLst>
+                                        <p:tav tm="0">
+                                          <p:val>
+                                            <p:strVal val="#ppt_x"/>
+                                          </p:val>
+                                        </p:tav>
+                                        <p:tav tm="100000">
+                                          <p:val>
+                                            <p:strVal val="#ppt_x"/>
+                                          </p:val>
+                                        </p:tav>
+                                      </p:tavLst>
+                                    </p:anim>
+                                    <p:anim calcmode="lin" valueType="num">
+                                      <p:cBhvr>
+                                        <p:cTn id="39" dur="1000" fill="hold"/>
+                                        <p:tgtEl>
+                                          <p:spTgt spid="3">
+                                            <p:txEl>
+                                              <p:pRg st="5" end="5"/>
+                                            </p:txEl>
+                                          </p:spTgt>
+                                        </p:tgtEl>
+                                        <p:attrNameLst>
+                                          <p:attrName>ppt_y</p:attrName>
+                                        </p:attrNameLst>
+                                      </p:cBhvr>
+                                      <p:tavLst>
+                                        <p:tav tm="0">
+                                          <p:val>
+                                            <p:strVal val="#ppt_y+.1"/>
+                                          </p:val>
+                                        </p:tav>
+                                        <p:tav tm="100000">
+                                          <p:val>
+                                            <p:strVal val="#ppt_y"/>
+                                          </p:val>
+                                        </p:tav>
+                                      </p:tavLst>
+                                    </p:anim>
+                                  </p:childTnLst>
+                                </p:cTn>
+                              </p:par>
+                              <p:par>
+                                <p:cTn id="40" presetID="42" presetClass="entr" presetSubtype="0" fill="hold" grpId="0" nodeType="withEffect">
+                                  <p:stCondLst>
+                                    <p:cond delay="0"/>
+                                  </p:stCondLst>
+                                  <p:childTnLst>
+                                    <p:set>
+                                      <p:cBhvr>
+                                        <p:cTn id="41" dur="1" fill="hold">
+                                          <p:stCondLst>
+                                            <p:cond delay="0"/>
+                                          </p:stCondLst>
+                                        </p:cTn>
+                                        <p:tgtEl>
+                                          <p:spTgt spid="3">
+                                            <p:txEl>
+                                              <p:pRg st="6" end="6"/>
+                                            </p:txEl>
+                                          </p:spTgt>
+                                        </p:tgtEl>
+                                        <p:attrNameLst>
+                                          <p:attrName>style.visibility</p:attrName>
+                                        </p:attrNameLst>
+                                      </p:cBhvr>
+                                      <p:to>
+                                        <p:strVal val="visible"/>
+                                      </p:to>
+                                    </p:set>
+                                    <p:animEffect transition="in" filter="fade">
+                                      <p:cBhvr>
+                                        <p:cTn id="42" dur="1000"/>
+                                        <p:tgtEl>
+                                          <p:spTgt spid="3">
+                                            <p:txEl>
+                                              <p:pRg st="6" end="6"/>
+                                            </p:txEl>
+                                          </p:spTgt>
+                                        </p:tgtEl>
+                                      </p:cBhvr>
+                                    </p:animEffect>
+                                    <p:anim calcmode="lin" valueType="num">
+                                      <p:cBhvr>
+                                        <p:cTn id="43" dur="1000" fill="hold"/>
+                                        <p:tgtEl>
+                                          <p:spTgt spid="3">
+                                            <p:txEl>
+                                              <p:pRg st="6" end="6"/>
+                                            </p:txEl>
+                                          </p:spTgt>
+                                        </p:tgtEl>
+                                        <p:attrNameLst>
+                                          <p:attrName>ppt_x</p:attrName>
+                                        </p:attrNameLst>
+                                      </p:cBhvr>
+                                      <p:tavLst>
+                                        <p:tav tm="0">
+                                          <p:val>
+                                            <p:strVal val="#ppt_x"/>
+                                          </p:val>
+                                        </p:tav>
+                                        <p:tav tm="100000">
+                                          <p:val>
+                                            <p:strVal val="#ppt_x"/>
+                                          </p:val>
+                                        </p:tav>
+                                      </p:tavLst>
+                                    </p:anim>
+                                    <p:anim calcmode="lin" valueType="num">
+                                      <p:cBhvr>
+                                        <p:cTn id="44" dur="1000" fill="hold"/>
+                                        <p:tgtEl>
+                                          <p:spTgt spid="3">
+                                            <p:txEl>
+                                              <p:pRg st="6" end="6"/>
+                                            </p:txEl>
+                                          </p:spTgt>
+                                        </p:tgtEl>
+                                        <p:attrNameLst>
+                                          <p:attrName>ppt_y</p:attrName>
+                                        </p:attrNameLst>
+                                      </p:cBhvr>
+                                      <p:tavLst>
+                                        <p:tav tm="0">
+                                          <p:val>
+                                            <p:strVal val="#ppt_y+.1"/>
+                                          </p:val>
+                                        </p:tav>
+                                        <p:tav tm="100000">
+                                          <p:val>
+                                            <p:strVal val="#ppt_y"/>
+                                          </p:val>
+                                        </p:tav>
+                                      </p:tavLst>
+                                    </p:anim>
+                                  </p:childTnLst>
+                                </p:cTn>
+                              </p:par>
+                              <p:par>
+                                <p:cTn id="45" presetID="42" presetClass="entr" presetSubtype="0" fill="hold" grpId="0" nodeType="withEffect">
+                                  <p:stCondLst>
+                                    <p:cond delay="0"/>
+                                  </p:stCondLst>
+                                  <p:childTnLst>
+                                    <p:set>
+                                      <p:cBhvr>
+                                        <p:cTn id="46" dur="1" fill="hold">
+                                          <p:stCondLst>
+                                            <p:cond delay="0"/>
+                                          </p:stCondLst>
+                                        </p:cTn>
+                                        <p:tgtEl>
+                                          <p:spTgt spid="3">
+                                            <p:txEl>
+                                              <p:pRg st="7" end="7"/>
+                                            </p:txEl>
+                                          </p:spTgt>
+                                        </p:tgtEl>
+                                        <p:attrNameLst>
+                                          <p:attrName>style.visibility</p:attrName>
+                                        </p:attrNameLst>
+                                      </p:cBhvr>
+                                      <p:to>
+                                        <p:strVal val="visible"/>
+                                      </p:to>
+                                    </p:set>
+                                    <p:animEffect transition="in" filter="fade">
+                                      <p:cBhvr>
+                                        <p:cTn id="47" dur="1000"/>
+                                        <p:tgtEl>
+                                          <p:spTgt spid="3">
+                                            <p:txEl>
+                                              <p:pRg st="7" end="7"/>
+                                            </p:txEl>
+                                          </p:spTgt>
+                                        </p:tgtEl>
+                                      </p:cBhvr>
+                                    </p:animEffect>
+                                    <p:anim calcmode="lin" valueType="num">
+                                      <p:cBhvr>
+                                        <p:cTn id="48" dur="1000" fill="hold"/>
+                                        <p:tgtEl>
+                                          <p:spTgt spid="3">
+                                            <p:txEl>
+                                              <p:pRg st="7" end="7"/>
+                                            </p:txEl>
+                                          </p:spTgt>
+                                        </p:tgtEl>
+                                        <p:attrNameLst>
+                                          <p:attrName>ppt_x</p:attrName>
+                                        </p:attrNameLst>
+                                      </p:cBhvr>
+                                      <p:tavLst>
+                                        <p:tav tm="0">
+                                          <p:val>
+                                            <p:strVal val="#ppt_x"/>
+                                          </p:val>
+                                        </p:tav>
+                                        <p:tav tm="100000">
+                                          <p:val>
+                                            <p:strVal val="#ppt_x"/>
+                                          </p:val>
+                                        </p:tav>
+                                      </p:tavLst>
+                                    </p:anim>
+                                    <p:anim calcmode="lin" valueType="num">
+                                      <p:cBhvr>
+                                        <p:cTn id="49" dur="1000" fill="hold"/>
+                                        <p:tgtEl>
+                                          <p:spTgt spid="3">
+                                            <p:txEl>
+                                              <p:pRg st="7" end="7"/>
+                                            </p:txEl>
+                                          </p:spTgt>
+                                        </p:tgtEl>
+                                        <p:attrNameLst>
+                                          <p:attrName>ppt_y</p:attrName>
+                                        </p:attrNameLst>
+                                      </p:cBhvr>
+                                      <p:tavLst>
+                                        <p:tav tm="0">
+                                          <p:val>
+                                            <p:strVal val="#ppt_y+.1"/>
+                                          </p:val>
+                                        </p:tav>
+                                        <p:tav tm="100000">
+                                          <p:val>
+                                            <p:strVal val="#ppt_y"/>
+                                          </p:val>
+                                        </p:tav>
+                                      </p:tavLst>
+                                    </p:anim>
+                                  </p:childTnLst>
+                                </p:cTn>
+                              </p:par>
+                              <p:par>
+                                <p:cTn id="50" presetID="42" presetClass="entr" presetSubtype="0" fill="hold" grpId="0" nodeType="withEffect">
+                                  <p:stCondLst>
+                                    <p:cond delay="0"/>
+                                  </p:stCondLst>
+                                  <p:childTnLst>
+                                    <p:set>
+                                      <p:cBhvr>
+                                        <p:cTn id="51" dur="1" fill="hold">
+                                          <p:stCondLst>
+                                            <p:cond delay="0"/>
+                                          </p:stCondLst>
+                                        </p:cTn>
+                                        <p:tgtEl>
+                                          <p:spTgt spid="3">
+                                            <p:txEl>
+                                              <p:pRg st="8" end="8"/>
+                                            </p:txEl>
+                                          </p:spTgt>
+                                        </p:tgtEl>
+                                        <p:attrNameLst>
+                                          <p:attrName>style.visibility</p:attrName>
+                                        </p:attrNameLst>
+                                      </p:cBhvr>
+                                      <p:to>
+                                        <p:strVal val="visible"/>
+                                      </p:to>
+                                    </p:set>
+                                    <p:animEffect transition="in" filter="fade">
+                                      <p:cBhvr>
+                                        <p:cTn id="52" dur="1000"/>
+                                        <p:tgtEl>
+                                          <p:spTgt spid="3">
+                                            <p:txEl>
+                                              <p:pRg st="8" end="8"/>
+                                            </p:txEl>
+                                          </p:spTgt>
+                                        </p:tgtEl>
+                                      </p:cBhvr>
+                                    </p:animEffect>
+                                    <p:anim calcmode="lin" valueType="num">
+                                      <p:cBhvr>
+                                        <p:cTn id="53" dur="1000" fill="hold"/>
+                                        <p:tgtEl>
+                                          <p:spTgt spid="3">
+                                            <p:txEl>
+                                              <p:pRg st="8" end="8"/>
+                                            </p:txEl>
+                                          </p:spTgt>
+                                        </p:tgtEl>
+                                        <p:attrNameLst>
+                                          <p:attrName>ppt_x</p:attrName>
+                                        </p:attrNameLst>
+                                      </p:cBhvr>
+                                      <p:tavLst>
+                                        <p:tav tm="0">
+                                          <p:val>
+                                            <p:strVal val="#ppt_x"/>
+                                          </p:val>
+                                        </p:tav>
+                                        <p:tav tm="100000">
+                                          <p:val>
+                                            <p:strVal val="#ppt_x"/>
+                                          </p:val>
+                                        </p:tav>
+                                      </p:tavLst>
+                                    </p:anim>
+                                    <p:anim calcmode="lin" valueType="num">
+                                      <p:cBhvr>
+                                        <p:cTn id="54" dur="1000" fill="hold"/>
+                                        <p:tgtEl>
+                                          <p:spTgt spid="3">
+                                            <p:txEl>
+                                              <p:pRg st="8" end="8"/>
+                                            </p:txEl>
+                                          </p:spTgt>
+                                        </p:tgtEl>
+                                        <p:attrNameLst>
+                                          <p:attrName>ppt_y</p:attrName>
+                                        </p:attrNameLst>
+                                      </p:cBhvr>
+                                      <p:tavLst>
+                                        <p:tav tm="0">
+                                          <p:val>
+                                            <p:strVal val="#ppt_y+.1"/>
+                                          </p:val>
+                                        </p:tav>
+                                        <p:tav tm="100000">
+                                          <p:val>
+                                            <p:strVal val="#ppt_y"/>
+                                          </p:val>
+                                        </p:tav>
+                                      </p:tavLst>
+                                    </p:anim>
+                                  </p:childTnLst>
+                                </p:cTn>
+                              </p:par>
+                              <p:par>
+                                <p:cTn id="55" presetID="42" presetClass="entr" presetSubtype="0" fill="hold" grpId="0" nodeType="withEffect">
+                                  <p:stCondLst>
+                                    <p:cond delay="0"/>
+                                  </p:stCondLst>
+                                  <p:childTnLst>
+                                    <p:set>
+                                      <p:cBhvr>
+                                        <p:cTn id="56" dur="1" fill="hold">
+                                          <p:stCondLst>
+                                            <p:cond delay="0"/>
+                                          </p:stCondLst>
+                                        </p:cTn>
+                                        <p:tgtEl>
+                                          <p:spTgt spid="3">
+                                            <p:txEl>
+                                              <p:pRg st="9" end="9"/>
+                                            </p:txEl>
+                                          </p:spTgt>
+                                        </p:tgtEl>
+                                        <p:attrNameLst>
+                                          <p:attrName>style.visibility</p:attrName>
+                                        </p:attrNameLst>
+                                      </p:cBhvr>
+                                      <p:to>
+                                        <p:strVal val="visible"/>
+                                      </p:to>
+                                    </p:set>
+                                    <p:animEffect transition="in" filter="fade">
+                                      <p:cBhvr>
+                                        <p:cTn id="57" dur="1000"/>
+                                        <p:tgtEl>
+                                          <p:spTgt spid="3">
+                                            <p:txEl>
+                                              <p:pRg st="9" end="9"/>
+                                            </p:txEl>
+                                          </p:spTgt>
+                                        </p:tgtEl>
+                                      </p:cBhvr>
+                                    </p:animEffect>
+                                    <p:anim calcmode="lin" valueType="num">
+                                      <p:cBhvr>
+                                        <p:cTn id="58" dur="1000" fill="hold"/>
+                                        <p:tgtEl>
+                                          <p:spTgt spid="3">
+                                            <p:txEl>
+                                              <p:pRg st="9" end="9"/>
+                                            </p:txEl>
+                                          </p:spTgt>
+                                        </p:tgtEl>
+                                        <p:attrNameLst>
+                                          <p:attrName>ppt_x</p:attrName>
+                                        </p:attrNameLst>
+                                      </p:cBhvr>
+                                      <p:tavLst>
+                                        <p:tav tm="0">
+                                          <p:val>
+                                            <p:strVal val="#ppt_x"/>
+                                          </p:val>
+                                        </p:tav>
+                                        <p:tav tm="100000">
+                                          <p:val>
+                                            <p:strVal val="#ppt_x"/>
+                                          </p:val>
+                                        </p:tav>
+                                      </p:tavLst>
+                                    </p:anim>
+                                    <p:anim calcmode="lin" valueType="num">
+                                      <p:cBhvr>
+                                        <p:cTn id="59" dur="1000" fill="hold"/>
+                                        <p:tgtEl>
+                                          <p:spTgt spid="3">
+                                            <p:txEl>
+                                              <p:pRg st="9" end="9"/>
+                                            </p:txEl>
+                                          </p:spTgt>
+                                        </p:tgtEl>
+                                        <p:attrNameLst>
+                                          <p:attrName>ppt_y</p:attrName>
+                                        </p:attrNameLst>
+                                      </p:cBhvr>
+                                      <p:tavLst>
+                                        <p:tav tm="0">
+                                          <p:val>
+                                            <p:strVal val="#ppt_y+.1"/>
+                                          </p:val>
+                                        </p:tav>
+                                        <p:tav tm="100000">
+                                          <p:val>
+                                            <p:strVal val="#ppt_y"/>
+                                          </p:val>
+                                        </p:tav>
+                                      </p:tavLst>
+                                    </p:anim>
+                                  </p:childTnLst>
+                                </p:cTn>
+                              </p:par>
+                              <p:par>
+                                <p:cTn id="60" presetID="42" presetClass="entr" presetSubtype="0" fill="hold" grpId="0" nodeType="withEffect">
+                                  <p:stCondLst>
+                                    <p:cond delay="0"/>
+                                  </p:stCondLst>
+                                  <p:childTnLst>
+                                    <p:set>
+                                      <p:cBhvr>
+                                        <p:cTn id="61" dur="1" fill="hold">
+                                          <p:stCondLst>
+                                            <p:cond delay="0"/>
+                                          </p:stCondLst>
+                                        </p:cTn>
+                                        <p:tgtEl>
+                                          <p:spTgt spid="3">
+                                            <p:txEl>
+                                              <p:pRg st="10" end="10"/>
+                                            </p:txEl>
+                                          </p:spTgt>
+                                        </p:tgtEl>
+                                        <p:attrNameLst>
+                                          <p:attrName>style.visibility</p:attrName>
+                                        </p:attrNameLst>
+                                      </p:cBhvr>
+                                      <p:to>
+                                        <p:strVal val="visible"/>
+                                      </p:to>
+                                    </p:set>
+                                    <p:animEffect transition="in" filter="fade">
+                                      <p:cBhvr>
+                                        <p:cTn id="62" dur="1000"/>
+                                        <p:tgtEl>
+                                          <p:spTgt spid="3">
+                                            <p:txEl>
+                                              <p:pRg st="10" end="10"/>
+                                            </p:txEl>
+                                          </p:spTgt>
+                                        </p:tgtEl>
+                                      </p:cBhvr>
+                                    </p:animEffect>
+                                    <p:anim calcmode="lin" valueType="num">
+                                      <p:cBhvr>
+                                        <p:cTn id="63" dur="1000" fill="hold"/>
+                                        <p:tgtEl>
+                                          <p:spTgt spid="3">
+                                            <p:txEl>
+                                              <p:pRg st="10" end="10"/>
+                                            </p:txEl>
+                                          </p:spTgt>
+                                        </p:tgtEl>
+                                        <p:attrNameLst>
+                                          <p:attrName>ppt_x</p:attrName>
+                                        </p:attrNameLst>
+                                      </p:cBhvr>
+                                      <p:tavLst>
+                                        <p:tav tm="0">
+                                          <p:val>
+                                            <p:strVal val="#ppt_x"/>
+                                          </p:val>
+                                        </p:tav>
+                                        <p:tav tm="100000">
+                                          <p:val>
+                                            <p:strVal val="#ppt_x"/>
+                                          </p:val>
+                                        </p:tav>
+                                      </p:tavLst>
+                                    </p:anim>
+                                    <p:anim calcmode="lin" valueType="num">
+                                      <p:cBhvr>
+                                        <p:cTn id="64" dur="1000" fill="hold"/>
+                                        <p:tgtEl>
+                                          <p:spTgt spid="3">
+                                            <p:txEl>
+                                              <p:pRg st="10" end="10"/>
+                                            </p:txEl>
+                                          </p:spTgt>
+                                        </p:tgtEl>
+                                        <p:attrNameLst>
+                                          <p:attrName>ppt_y</p:attrName>
+                                        </p:attrNameLst>
+                                      </p:cBhvr>
+                                      <p:tavLst>
+                                        <p:tav tm="0">
+                                          <p:val>
+                                            <p:strVal val="#ppt_y+.1"/>
+                                          </p:val>
+                                        </p:tav>
+                                        <p:tav tm="100000">
+                                          <p:val>
+                                            <p:strVal val="#ppt_y"/>
+                                          </p:val>
+                                        </p:tav>
+                                      </p:tavLst>
+                                    </p:anim>
+                                  </p:childTnLst>
+                                </p:cTn>
+                              </p:par>
+                              <p:par>
+                                <p:cTn id="65" presetID="42" presetClass="entr" presetSubtype="0" fill="hold" grpId="0" nodeType="withEffect">
+                                  <p:stCondLst>
+                                    <p:cond delay="0"/>
+                                  </p:stCondLst>
+                                  <p:childTnLst>
+                                    <p:set>
+                                      <p:cBhvr>
+                                        <p:cTn id="66" dur="1" fill="hold">
+                                          <p:stCondLst>
+                                            <p:cond delay="0"/>
+                                          </p:stCondLst>
+                                        </p:cTn>
+                                        <p:tgtEl>
+                                          <p:spTgt spid="3">
+                                            <p:txEl>
+                                              <p:pRg st="11" end="11"/>
+                                            </p:txEl>
+                                          </p:spTgt>
+                                        </p:tgtEl>
+                                        <p:attrNameLst>
+                                          <p:attrName>style.visibility</p:attrName>
+                                        </p:attrNameLst>
+                                      </p:cBhvr>
+                                      <p:to>
+                                        <p:strVal val="visible"/>
+                                      </p:to>
+                                    </p:set>
+                                    <p:animEffect transition="in" filter="fade">
+                                      <p:cBhvr>
+                                        <p:cTn id="67" dur="1000"/>
+                                        <p:tgtEl>
+                                          <p:spTgt spid="3">
+                                            <p:txEl>
+                                              <p:pRg st="11" end="11"/>
+                                            </p:txEl>
+                                          </p:spTgt>
+                                        </p:tgtEl>
+                                      </p:cBhvr>
+                                    </p:animEffect>
+                                    <p:anim calcmode="lin" valueType="num">
+                                      <p:cBhvr>
+                                        <p:cTn id="68" dur="1000" fill="hold"/>
+                                        <p:tgtEl>
+                                          <p:spTgt spid="3">
+                                            <p:txEl>
+                                              <p:pRg st="11" end="11"/>
+                                            </p:txEl>
+                                          </p:spTgt>
+                                        </p:tgtEl>
+                                        <p:attrNameLst>
+                                          <p:attrName>ppt_x</p:attrName>
+                                        </p:attrNameLst>
+                                      </p:cBhvr>
+                                      <p:tavLst>
+                                        <p:tav tm="0">
+                                          <p:val>
+                                            <p:strVal val="#ppt_x"/>
+                                          </p:val>
+                                        </p:tav>
+                                        <p:tav tm="100000">
+                                          <p:val>
+                                            <p:strVal val="#ppt_x"/>
+                                          </p:val>
+                                        </p:tav>
+                                      </p:tavLst>
+                                    </p:anim>
+                                    <p:anim calcmode="lin" valueType="num">
+                                      <p:cBhvr>
+                                        <p:cTn id="69" dur="1000" fill="hold"/>
+                                        <p:tgtEl>
+                                          <p:spTgt spid="3">
+                                            <p:txEl>
+                                              <p:pRg st="11" end="11"/>
+                                            </p:txEl>
+                                          </p:spTgt>
+                                        </p:tgtEl>
+                                        <p:attrNameLst>
+                                          <p:attrName>ppt_y</p:attrName>
+                                        </p:attrNameLst>
+                                      </p:cBhvr>
+                                      <p:tavLst>
+                                        <p:tav tm="0">
+                                          <p:val>
+                                            <p:strVal val="#ppt_y+.1"/>
+                                          </p:val>
+                                        </p:tav>
+                                        <p:tav tm="100000">
+                                          <p:val>
+                                            <p:strVal val="#ppt_y"/>
+                                          </p:val>
+                                        </p:tav>
+                                      </p:tavLst>
+                                    </p:anim>
+                                  </p:childTnLst>
+                                </p:cTn>
+                              </p:par>
+                              <p:par>
+                                <p:cTn id="70" presetID="42" presetClass="entr" presetSubtype="0" fill="hold" grpId="0" nodeType="withEffect">
+                                  <p:stCondLst>
+                                    <p:cond delay="0"/>
+                                  </p:stCondLst>
+                                  <p:childTnLst>
+                                    <p:set>
+                                      <p:cBhvr>
+                                        <p:cTn id="71" dur="1" fill="hold">
+                                          <p:stCondLst>
+                                            <p:cond delay="0"/>
+                                          </p:stCondLst>
+                                        </p:cTn>
+                                        <p:tgtEl>
+                                          <p:spTgt spid="3">
+                                            <p:txEl>
+                                              <p:pRg st="12" end="12"/>
+                                            </p:txEl>
+                                          </p:spTgt>
+                                        </p:tgtEl>
+                                        <p:attrNameLst>
+                                          <p:attrName>style.visibility</p:attrName>
+                                        </p:attrNameLst>
+                                      </p:cBhvr>
+                                      <p:to>
+                                        <p:strVal val="visible"/>
+                                      </p:to>
+                                    </p:set>
+                                    <p:animEffect transition="in" filter="fade">
+                                      <p:cBhvr>
+                                        <p:cTn id="72" dur="1000"/>
+                                        <p:tgtEl>
+                                          <p:spTgt spid="3">
+                                            <p:txEl>
+                                              <p:pRg st="12" end="12"/>
+                                            </p:txEl>
+                                          </p:spTgt>
+                                        </p:tgtEl>
+                                      </p:cBhvr>
+                                    </p:animEffect>
+                                    <p:anim calcmode="lin" valueType="num">
+                                      <p:cBhvr>
+                                        <p:cTn id="73" dur="1000" fill="hold"/>
+                                        <p:tgtEl>
+                                          <p:spTgt spid="3">
+                                            <p:txEl>
+                                              <p:pRg st="12" end="12"/>
+                                            </p:txEl>
+                                          </p:spTgt>
+                                        </p:tgtEl>
+                                        <p:attrNameLst>
+                                          <p:attrName>ppt_x</p:attrName>
+                                        </p:attrNameLst>
+                                      </p:cBhvr>
+                                      <p:tavLst>
+                                        <p:tav tm="0">
+                                          <p:val>
+                                            <p:strVal val="#ppt_x"/>
+                                          </p:val>
+                                        </p:tav>
+                                        <p:tav tm="100000">
+                                          <p:val>
+                                            <p:strVal val="#ppt_x"/>
+                                          </p:val>
+                                        </p:tav>
+                                      </p:tavLst>
+                                    </p:anim>
+                                    <p:anim calcmode="lin" valueType="num">
+                                      <p:cBhvr>
+                                        <p:cTn id="74" dur="1000" fill="hold"/>
+                                        <p:tgtEl>
+                                          <p:spTgt spid="3">
+                                            <p:txEl>
+                                              <p:pRg st="12" end="12"/>
+                                            </p:txEl>
+                                          </p:spTgt>
+                                        </p:tgtEl>
+                                        <p:attrNameLst>
+                                          <p:attrName>ppt_y</p:attrName>
+                                        </p:attrNameLst>
+                                      </p:cBhvr>
+                                      <p:tavLst>
+                                        <p:tav tm="0">
+                                          <p:val>
+                                            <p:strVal val="#ppt_y+.1"/>
+                                          </p:val>
+                                        </p:tav>
+                                        <p:tav tm="100000">
+                                          <p:val>
+                                            <p:strVal val="#ppt_y"/>
+                                          </p:val>
+                                        </p:tav>
+                                      </p:tavLst>
+                                    </p:anim>
+                                  </p:childTnLst>
+                                </p:cTn>
+                              </p:par>
+                            </p:childTnLst>
+                          </p:cTn>
+                        </p:par>
+                      </p:childTnLst>
+                    </p:cTn>
+                  </p:par>
+                </p:childTnLst>
+              </p:cTn>
+              <p:prevCondLst>
+                <p:cond evt="onPrev" delay="0">
+                  <p:tgtEl>
+                    <p:sldTgt/>
+                  </p:tgtEl>
+                </p:cond>
+              </p:prevCondLst>
+              <p:nextCondLst>
+                <p:cond evt="onNext" delay="0">
+                  <p:tgtEl>
+                    <p:sldTgt/>
+                  </p:tgtEl>
+                </p:cond>
+              </p:nextCondLst>
+            </p:seq>
+          </p:childTnLst>
+        </p:cTn>
       </p:par>
     </p:tnLst>
+    <p:bldLst>
+      <p:bldP spid="3" grpId="0" build="p"/>
+      <p:bldP spid="6" grpId="0"/>
+    </p:bldLst>
   </p:timing>
 </p:sld>
 </file>
@@ -14197,7 +15861,7 @@
 <file path=ppt/theme/theme1.xml><?xml version="1.0" encoding="utf-8"?>
 <a:theme xmlns:a="http://schemas.openxmlformats.org/drawingml/2006/main" name="Larissa">
   <a:themeElements>
-    <a:clrScheme name="Larissa">
+    <a:clrScheme name="DoodleDebug">
       <a:dk1>
         <a:sysClr val="windowText" lastClr="000000"/>
       </a:dk1>
@@ -14229,10 +15893,10 @@
         <a:srgbClr val="F79646"/>
       </a:accent6>
       <a:hlink>
-        <a:srgbClr val="0000FF"/>
+        <a:srgbClr val="00B0F0"/>
       </a:hlink>
       <a:folHlink>
-        <a:srgbClr val="800080"/>
+        <a:srgbClr val="00B0F0"/>
       </a:folHlink>
     </a:clrScheme>
     <a:fontScheme name="Larissa">

</xml_diff>